<commit_message>
Final version - after presentation
Ok
</commit_message>
<xml_diff>
--- a/CT-ShrePoint FrameWork - Tarabica 2017 - Main.pptx
+++ b/CT-ShrePoint FrameWork - Tarabica 2017 - Main.pptx
@@ -5,7 +5,7 @@
     <p:sldMasterId id="2147483648" r:id="rId4"/>
   </p:sldMasterIdLst>
   <p:notesMasterIdLst>
-    <p:notesMasterId r:id="rId30"/>
+    <p:notesMasterId r:id="rId28"/>
   </p:notesMasterIdLst>
   <p:sldIdLst>
     <p:sldId id="256" r:id="rId5"/>
@@ -16,23 +16,21 @@
     <p:sldId id="266" r:id="rId10"/>
     <p:sldId id="267" r:id="rId11"/>
     <p:sldId id="268" r:id="rId12"/>
-    <p:sldId id="269" r:id="rId13"/>
-    <p:sldId id="270" r:id="rId14"/>
-    <p:sldId id="271" r:id="rId15"/>
-    <p:sldId id="272" r:id="rId16"/>
-    <p:sldId id="273" r:id="rId17"/>
-    <p:sldId id="274" r:id="rId18"/>
-    <p:sldId id="275" r:id="rId19"/>
-    <p:sldId id="276" r:id="rId20"/>
-    <p:sldId id="277" r:id="rId21"/>
-    <p:sldId id="278" r:id="rId22"/>
-    <p:sldId id="279" r:id="rId23"/>
-    <p:sldId id="280" r:id="rId24"/>
-    <p:sldId id="281" r:id="rId25"/>
-    <p:sldId id="282" r:id="rId26"/>
-    <p:sldId id="283" r:id="rId27"/>
-    <p:sldId id="284" r:id="rId28"/>
-    <p:sldId id="285" r:id="rId29"/>
+    <p:sldId id="270" r:id="rId13"/>
+    <p:sldId id="271" r:id="rId14"/>
+    <p:sldId id="272" r:id="rId15"/>
+    <p:sldId id="273" r:id="rId16"/>
+    <p:sldId id="274" r:id="rId17"/>
+    <p:sldId id="275" r:id="rId18"/>
+    <p:sldId id="276" r:id="rId19"/>
+    <p:sldId id="277" r:id="rId20"/>
+    <p:sldId id="278" r:id="rId21"/>
+    <p:sldId id="279" r:id="rId22"/>
+    <p:sldId id="281" r:id="rId23"/>
+    <p:sldId id="282" r:id="rId24"/>
+    <p:sldId id="283" r:id="rId25"/>
+    <p:sldId id="284" r:id="rId26"/>
+    <p:sldId id="285" r:id="rId27"/>
   </p:sldIdLst>
   <p:sldSz cx="9144000" cy="6858000" type="screen4x3"/>
   <p:notesSz cx="6858000" cy="9144000"/>
@@ -232,7 +230,7 @@
           <a:p>
             <a:fld id="{8F76139A-24C7-4E3B-A1A3-31830543C183}" type="datetimeFigureOut">
               <a:rPr lang="en-US" smtClean="0"/>
-              <a:t>11-Sep-17</a:t>
+              <a:t>12-Sep-17</a:t>
             </a:fld>
             <a:endParaRPr lang="en-US"/>
           </a:p>
@@ -628,91 +626,7 @@
           <a:bodyPr/>
           <a:lstStyle/>
           <a:p>
-            <a:endParaRPr lang="sr-Latn-RS"/>
-          </a:p>
-        </p:txBody>
-      </p:sp>
-      <p:sp>
-        <p:nvSpPr>
-          <p:cNvPr id="4" name="Slide Number Placeholder 3"/>
-          <p:cNvSpPr>
-            <a:spLocks noGrp="1"/>
-          </p:cNvSpPr>
-          <p:nvPr>
-            <p:ph type="sldNum" sz="quarter" idx="10"/>
-          </p:nvPr>
-        </p:nvSpPr>
-        <p:spPr/>
-        <p:txBody>
-          <a:bodyPr/>
-          <a:lstStyle/>
-          <a:p>
-            <a:fld id="{C69629AB-7DF7-470D-B9D5-95F7D20FABA9}" type="slidenum">
-              <a:rPr lang="sr-Latn-RS" smtClean="0"/>
-              <a:t>21</a:t>
-            </a:fld>
-            <a:endParaRPr lang="sr-Latn-RS"/>
-          </a:p>
-        </p:txBody>
-      </p:sp>
-    </p:spTree>
-    <p:extLst>
-      <p:ext uri="{BB962C8B-B14F-4D97-AF65-F5344CB8AC3E}">
-        <p14:creationId xmlns:p14="http://schemas.microsoft.com/office/powerpoint/2010/main" val="1292209291"/>
-      </p:ext>
-    </p:extLst>
-  </p:cSld>
-  <p:clrMapOvr>
-    <a:masterClrMapping/>
-  </p:clrMapOvr>
-</p:notes>
-</file>
-
-<file path=ppt/notesSlides/notesSlide11.xml><?xml version="1.0" encoding="utf-8"?>
-<p:notes xmlns:a="http://schemas.openxmlformats.org/drawingml/2006/main" xmlns:r="http://schemas.openxmlformats.org/officeDocument/2006/relationships" xmlns:p="http://schemas.openxmlformats.org/presentationml/2006/main">
-  <p:cSld>
-    <p:spTree>
-      <p:nvGrpSpPr>
-        <p:cNvPr id="1" name=""/>
-        <p:cNvGrpSpPr/>
-        <p:nvPr/>
-      </p:nvGrpSpPr>
-      <p:grpSpPr>
-        <a:xfrm>
-          <a:off x="0" y="0"/>
-          <a:ext cx="0" cy="0"/>
-          <a:chOff x="0" y="0"/>
-          <a:chExt cx="0" cy="0"/>
-        </a:xfrm>
-      </p:grpSpPr>
-      <p:sp>
-        <p:nvSpPr>
-          <p:cNvPr id="2" name="Slide Image Placeholder 1"/>
-          <p:cNvSpPr>
-            <a:spLocks noGrp="1" noRot="1" noChangeAspect="1"/>
-          </p:cNvSpPr>
-          <p:nvPr>
-            <p:ph type="sldImg"/>
-          </p:nvPr>
-        </p:nvSpPr>
-        <p:spPr/>
-      </p:sp>
-      <p:sp>
-        <p:nvSpPr>
-          <p:cNvPr id="3" name="Notes Placeholder 2"/>
-          <p:cNvSpPr>
-            <a:spLocks noGrp="1"/>
-          </p:cNvSpPr>
-          <p:nvPr>
-            <p:ph type="body" idx="1"/>
-          </p:nvPr>
-        </p:nvSpPr>
-        <p:spPr/>
-        <p:txBody>
-          <a:bodyPr/>
-          <a:lstStyle/>
-          <a:p>
-            <a:endParaRPr lang="en-GB" dirty="0"/>
+            <a:endParaRPr lang="sr-Latn-RS" dirty="0"/>
           </a:p>
         </p:txBody>
       </p:sp>
@@ -734,90 +648,6 @@
             <a:fld id="{C69629AB-7DF7-470D-B9D5-95F7D20FABA9}" type="slidenum">
               <a:rPr lang="sr-Latn-RS" smtClean="0"/>
               <a:t>23</a:t>
-            </a:fld>
-            <a:endParaRPr lang="sr-Latn-RS"/>
-          </a:p>
-        </p:txBody>
-      </p:sp>
-    </p:spTree>
-    <p:extLst>
-      <p:ext uri="{BB962C8B-B14F-4D97-AF65-F5344CB8AC3E}">
-        <p14:creationId xmlns:p14="http://schemas.microsoft.com/office/powerpoint/2010/main" val="3240979699"/>
-      </p:ext>
-    </p:extLst>
-  </p:cSld>
-  <p:clrMapOvr>
-    <a:masterClrMapping/>
-  </p:clrMapOvr>
-</p:notes>
-</file>
-
-<file path=ppt/notesSlides/notesSlide12.xml><?xml version="1.0" encoding="utf-8"?>
-<p:notes xmlns:a="http://schemas.openxmlformats.org/drawingml/2006/main" xmlns:r="http://schemas.openxmlformats.org/officeDocument/2006/relationships" xmlns:p="http://schemas.openxmlformats.org/presentationml/2006/main">
-  <p:cSld>
-    <p:spTree>
-      <p:nvGrpSpPr>
-        <p:cNvPr id="1" name=""/>
-        <p:cNvGrpSpPr/>
-        <p:nvPr/>
-      </p:nvGrpSpPr>
-      <p:grpSpPr>
-        <a:xfrm>
-          <a:off x="0" y="0"/>
-          <a:ext cx="0" cy="0"/>
-          <a:chOff x="0" y="0"/>
-          <a:chExt cx="0" cy="0"/>
-        </a:xfrm>
-      </p:grpSpPr>
-      <p:sp>
-        <p:nvSpPr>
-          <p:cNvPr id="2" name="Slide Image Placeholder 1"/>
-          <p:cNvSpPr>
-            <a:spLocks noGrp="1" noRot="1" noChangeAspect="1"/>
-          </p:cNvSpPr>
-          <p:nvPr>
-            <p:ph type="sldImg"/>
-          </p:nvPr>
-        </p:nvSpPr>
-        <p:spPr/>
-      </p:sp>
-      <p:sp>
-        <p:nvSpPr>
-          <p:cNvPr id="3" name="Notes Placeholder 2"/>
-          <p:cNvSpPr>
-            <a:spLocks noGrp="1"/>
-          </p:cNvSpPr>
-          <p:nvPr>
-            <p:ph type="body" idx="1"/>
-          </p:nvPr>
-        </p:nvSpPr>
-        <p:spPr/>
-        <p:txBody>
-          <a:bodyPr/>
-          <a:lstStyle/>
-          <a:p>
-            <a:endParaRPr lang="sr-Latn-RS" dirty="0"/>
-          </a:p>
-        </p:txBody>
-      </p:sp>
-      <p:sp>
-        <p:nvSpPr>
-          <p:cNvPr id="4" name="Slide Number Placeholder 3"/>
-          <p:cNvSpPr>
-            <a:spLocks noGrp="1"/>
-          </p:cNvSpPr>
-          <p:nvPr>
-            <p:ph type="sldNum" sz="quarter" idx="10"/>
-          </p:nvPr>
-        </p:nvSpPr>
-        <p:spPr/>
-        <p:txBody>
-          <a:bodyPr/>
-          <a:lstStyle/>
-          <a:p>
-            <a:fld id="{C69629AB-7DF7-470D-B9D5-95F7D20FABA9}" type="slidenum">
-              <a:rPr lang="sr-Latn-RS" smtClean="0"/>
-              <a:t>25</a:t>
             </a:fld>
             <a:endParaRPr lang="sr-Latn-RS"/>
           </a:p>
@@ -1419,7 +1249,7 @@
           <a:p>
             <a:fld id="{C69629AB-7DF7-470D-B9D5-95F7D20FABA9}" type="slidenum">
               <a:rPr lang="sr-Latn-RS" smtClean="0"/>
-              <a:t>9</a:t>
+              <a:t>11</a:t>
             </a:fld>
             <a:endParaRPr lang="sr-Latn-RS"/>
           </a:p>
@@ -1428,7 +1258,7 @@
     </p:spTree>
     <p:extLst>
       <p:ext uri="{BB962C8B-B14F-4D97-AF65-F5344CB8AC3E}">
-        <p14:creationId xmlns:p14="http://schemas.microsoft.com/office/powerpoint/2010/main" val="1576905038"/>
+        <p14:creationId xmlns:p14="http://schemas.microsoft.com/office/powerpoint/2010/main" val="3648491948"/>
       </p:ext>
     </p:extLst>
   </p:cSld>
@@ -1482,7 +1312,7 @@
           <a:bodyPr/>
           <a:lstStyle/>
           <a:p>
-            <a:endParaRPr lang="en-GB" dirty="0"/>
+            <a:endParaRPr lang="sr-Latn-RS"/>
           </a:p>
         </p:txBody>
       </p:sp>
@@ -1503,7 +1333,7 @@
           <a:p>
             <a:fld id="{C69629AB-7DF7-470D-B9D5-95F7D20FABA9}" type="slidenum">
               <a:rPr lang="sr-Latn-RS" smtClean="0"/>
-              <a:t>12</a:t>
+              <a:t>19</a:t>
             </a:fld>
             <a:endParaRPr lang="sr-Latn-RS"/>
           </a:p>
@@ -1512,7 +1342,7 @@
     </p:spTree>
     <p:extLst>
       <p:ext uri="{BB962C8B-B14F-4D97-AF65-F5344CB8AC3E}">
-        <p14:creationId xmlns:p14="http://schemas.microsoft.com/office/powerpoint/2010/main" val="3648491948"/>
+        <p14:creationId xmlns:p14="http://schemas.microsoft.com/office/powerpoint/2010/main" val="1292209291"/>
       </p:ext>
     </p:extLst>
   </p:cSld>
@@ -1587,7 +1417,7 @@
           <a:p>
             <a:fld id="{C69629AB-7DF7-470D-B9D5-95F7D20FABA9}" type="slidenum">
               <a:rPr lang="sr-Latn-RS" smtClean="0"/>
-              <a:t>20</a:t>
+              <a:t>21</a:t>
             </a:fld>
             <a:endParaRPr lang="sr-Latn-RS"/>
           </a:p>
@@ -1596,7 +1426,7 @@
     </p:spTree>
     <p:extLst>
       <p:ext uri="{BB962C8B-B14F-4D97-AF65-F5344CB8AC3E}">
-        <p14:creationId xmlns:p14="http://schemas.microsoft.com/office/powerpoint/2010/main" val="1571680286"/>
+        <p14:creationId xmlns:p14="http://schemas.microsoft.com/office/powerpoint/2010/main" val="3240979699"/>
       </p:ext>
     </p:extLst>
   </p:cSld>
@@ -2504,247 +2334,6 @@
 
 <file path=ppt/slideLayouts/slideLayout15.xml><?xml version="1.0" encoding="utf-8"?>
 <p:sldLayout xmlns:a="http://schemas.openxmlformats.org/drawingml/2006/main" xmlns:r="http://schemas.openxmlformats.org/officeDocument/2006/relationships" xmlns:p="http://schemas.openxmlformats.org/presentationml/2006/main">
-  <p:cSld name="Two Colums">
-    <p:spTree>
-      <p:nvGrpSpPr>
-        <p:cNvPr id="1" name=""/>
-        <p:cNvGrpSpPr/>
-        <p:nvPr/>
-      </p:nvGrpSpPr>
-      <p:grpSpPr>
-        <a:xfrm>
-          <a:off x="0" y="0"/>
-          <a:ext cx="0" cy="0"/>
-          <a:chOff x="0" y="0"/>
-          <a:chExt cx="0" cy="0"/>
-        </a:xfrm>
-      </p:grpSpPr>
-      <p:sp>
-        <p:nvSpPr>
-          <p:cNvPr id="2" name="Titel 1"/>
-          <p:cNvSpPr>
-            <a:spLocks noGrp="1"/>
-          </p:cNvSpPr>
-          <p:nvPr>
-            <p:ph type="title" hasCustomPrompt="1"/>
-          </p:nvPr>
-        </p:nvSpPr>
-        <p:spPr>
-          <a:xfrm>
-            <a:off x="304802" y="274638"/>
-            <a:ext cx="8585200" cy="1143000"/>
-          </a:xfrm>
-        </p:spPr>
-        <p:txBody>
-          <a:bodyPr/>
-          <a:lstStyle>
-            <a:lvl1pPr>
-              <a:defRPr>
-                <a:solidFill>
-                  <a:schemeClr val="bg1"/>
-                </a:solidFill>
-              </a:defRPr>
-            </a:lvl1pPr>
-          </a:lstStyle>
-          <a:p>
-            <a:r>
-              <a:rPr lang="sr-Latn-RS" dirty="0"/>
-              <a:t>Title</a:t>
-            </a:r>
-            <a:endParaRPr lang="de-DE" dirty="0"/>
-          </a:p>
-        </p:txBody>
-      </p:sp>
-      <p:sp>
-        <p:nvSpPr>
-          <p:cNvPr id="3" name="Inhaltsplatzhalter 2"/>
-          <p:cNvSpPr>
-            <a:spLocks noGrp="1"/>
-          </p:cNvSpPr>
-          <p:nvPr>
-            <p:ph sz="half" idx="1" hasCustomPrompt="1"/>
-          </p:nvPr>
-        </p:nvSpPr>
-        <p:spPr>
-          <a:xfrm>
-            <a:off x="304802" y="1600204"/>
-            <a:ext cx="4190999" cy="4525963"/>
-          </a:xfrm>
-        </p:spPr>
-        <p:txBody>
-          <a:bodyPr/>
-          <a:lstStyle>
-            <a:lvl1pPr>
-              <a:defRPr sz="1575"/>
-            </a:lvl1pPr>
-            <a:lvl2pPr>
-              <a:defRPr sz="1350"/>
-            </a:lvl2pPr>
-            <a:lvl3pPr>
-              <a:defRPr sz="1125"/>
-            </a:lvl3pPr>
-            <a:lvl4pPr>
-              <a:defRPr sz="1013"/>
-            </a:lvl4pPr>
-            <a:lvl5pPr>
-              <a:defRPr sz="1013"/>
-            </a:lvl5pPr>
-            <a:lvl6pPr>
-              <a:defRPr sz="1013"/>
-            </a:lvl6pPr>
-            <a:lvl7pPr>
-              <a:defRPr sz="1013"/>
-            </a:lvl7pPr>
-            <a:lvl8pPr>
-              <a:defRPr sz="1013"/>
-            </a:lvl8pPr>
-            <a:lvl9pPr>
-              <a:defRPr sz="1013"/>
-            </a:lvl9pPr>
-          </a:lstStyle>
-          <a:p>
-            <a:pPr lvl="0"/>
-            <a:r>
-              <a:rPr lang="en-US" noProof="0" dirty="0"/>
-              <a:t>One</a:t>
-            </a:r>
-          </a:p>
-          <a:p>
-            <a:pPr lvl="1"/>
-            <a:r>
-              <a:rPr lang="en-US" noProof="0" dirty="0"/>
-              <a:t>Two</a:t>
-            </a:r>
-          </a:p>
-          <a:p>
-            <a:pPr lvl="2"/>
-            <a:r>
-              <a:rPr lang="en-US" noProof="0" dirty="0"/>
-              <a:t>Three</a:t>
-            </a:r>
-          </a:p>
-          <a:p>
-            <a:pPr lvl="3"/>
-            <a:r>
-              <a:rPr lang="en-US" noProof="0" dirty="0"/>
-              <a:t>Four</a:t>
-            </a:r>
-          </a:p>
-          <a:p>
-            <a:pPr lvl="4"/>
-            <a:r>
-              <a:rPr lang="en-US" noProof="0" dirty="0"/>
-              <a:t>Five</a:t>
-            </a:r>
-          </a:p>
-        </p:txBody>
-      </p:sp>
-      <p:sp>
-        <p:nvSpPr>
-          <p:cNvPr id="7" name="Inhaltsplatzhalter 3"/>
-          <p:cNvSpPr>
-            <a:spLocks noGrp="1"/>
-          </p:cNvSpPr>
-          <p:nvPr>
-            <p:ph sz="half" idx="2" hasCustomPrompt="1"/>
-          </p:nvPr>
-        </p:nvSpPr>
-        <p:spPr>
-          <a:xfrm>
-            <a:off x="4648200" y="1600204"/>
-            <a:ext cx="4241801" cy="4525963"/>
-          </a:xfrm>
-        </p:spPr>
-        <p:txBody>
-          <a:bodyPr/>
-          <a:lstStyle>
-            <a:lvl1pPr>
-              <a:defRPr sz="1575"/>
-            </a:lvl1pPr>
-            <a:lvl2pPr>
-              <a:defRPr sz="1350"/>
-            </a:lvl2pPr>
-            <a:lvl3pPr>
-              <a:defRPr sz="1125"/>
-            </a:lvl3pPr>
-            <a:lvl4pPr>
-              <a:defRPr sz="1013"/>
-            </a:lvl4pPr>
-            <a:lvl5pPr>
-              <a:defRPr sz="1013"/>
-            </a:lvl5pPr>
-            <a:lvl6pPr>
-              <a:defRPr sz="1013"/>
-            </a:lvl6pPr>
-            <a:lvl7pPr>
-              <a:defRPr sz="1013"/>
-            </a:lvl7pPr>
-            <a:lvl8pPr>
-              <a:defRPr sz="1013"/>
-            </a:lvl8pPr>
-            <a:lvl9pPr>
-              <a:defRPr sz="1013"/>
-            </a:lvl9pPr>
-          </a:lstStyle>
-          <a:p>
-            <a:pPr lvl="0"/>
-            <a:r>
-              <a:rPr lang="en-US" noProof="0" dirty="0"/>
-              <a:t>One</a:t>
-            </a:r>
-          </a:p>
-          <a:p>
-            <a:pPr lvl="1"/>
-            <a:r>
-              <a:rPr lang="en-US" noProof="0" dirty="0"/>
-              <a:t>Two</a:t>
-            </a:r>
-          </a:p>
-          <a:p>
-            <a:pPr lvl="2"/>
-            <a:r>
-              <a:rPr lang="en-US" noProof="0" dirty="0"/>
-              <a:t>Three</a:t>
-            </a:r>
-          </a:p>
-          <a:p>
-            <a:pPr lvl="3"/>
-            <a:r>
-              <a:rPr lang="en-US" noProof="0" dirty="0"/>
-              <a:t>Four</a:t>
-            </a:r>
-          </a:p>
-          <a:p>
-            <a:pPr lvl="4"/>
-            <a:r>
-              <a:rPr lang="en-US" noProof="0" dirty="0"/>
-              <a:t>Five</a:t>
-            </a:r>
-          </a:p>
-        </p:txBody>
-      </p:sp>
-    </p:spTree>
-    <p:extLst>
-      <p:ext uri="{BB962C8B-B14F-4D97-AF65-F5344CB8AC3E}">
-        <p14:creationId xmlns:p14="http://schemas.microsoft.com/office/powerpoint/2010/main" val="4219525935"/>
-      </p:ext>
-    </p:extLst>
-  </p:cSld>
-  <p:clrMapOvr>
-    <a:masterClrMapping/>
-  </p:clrMapOvr>
-  <p:timing>
-    <p:tnLst>
-      <p:par>
-        <p:cTn id="1" dur="indefinite" restart="never" nodeType="tmRoot"/>
-      </p:par>
-    </p:tnLst>
-  </p:timing>
-</p:sldLayout>
-</file>
-
-<file path=ppt/slideLayouts/slideLayout16.xml><?xml version="1.0" encoding="utf-8"?>
-<p:sldLayout xmlns:a="http://schemas.openxmlformats.org/drawingml/2006/main" xmlns:r="http://schemas.openxmlformats.org/officeDocument/2006/relationships" xmlns:p="http://schemas.openxmlformats.org/presentationml/2006/main">
   <p:cSld name="Questions">
     <p:spTree>
       <p:nvGrpSpPr>
@@ -4199,7 +3788,7 @@
     <p:bg>
       <p:bgPr>
         <a:blipFill dpi="0" rotWithShape="1">
-          <a:blip r:embed="rId18" cstate="print">
+          <a:blip r:embed="rId17" cstate="print">
             <a:lum/>
           </a:blip>
           <a:srcRect/>
@@ -4328,7 +3917,7 @@
           <p:nvPr userDrawn="1"/>
         </p:nvPicPr>
         <p:blipFill>
-          <a:blip r:embed="rId19" cstate="print"/>
+          <a:blip r:embed="rId18" cstate="print"/>
           <a:stretch>
             <a:fillRect/>
           </a:stretch>
@@ -4361,8 +3950,7 @@
     <p:sldLayoutId id="2147483661" r:id="rId12"/>
     <p:sldLayoutId id="2147483662" r:id="rId13"/>
     <p:sldLayoutId id="2147483663" r:id="rId14"/>
-    <p:sldLayoutId id="2147483664" r:id="rId15"/>
-    <p:sldLayoutId id="2147483665" r:id="rId16"/>
+    <p:sldLayoutId id="2147483665" r:id="rId15"/>
   </p:sldLayoutIdLst>
   <p:txStyles>
     <p:titleStyle>
@@ -4744,16 +4332,18 @@
         </p:nvSpPr>
         <p:spPr/>
         <p:txBody>
-          <a:bodyPr/>
+          <a:bodyPr>
+            <a:normAutofit fontScale="90000"/>
+          </a:bodyPr>
           <a:lstStyle/>
           <a:p>
             <a:r>
-              <a:rPr lang="en-GB" b="1" dirty="0"/>
-              <a:t>Customizations responsive &amp; </a:t>
-            </a:r>
-            <a:r>
-              <a:rPr lang="en-GB" b="1" dirty="0" smtClean="0"/>
-              <a:t>accessible</a:t>
+              <a:rPr lang="en-US" b="1" dirty="0"/>
+              <a:t>Development experience embraces web development </a:t>
+            </a:r>
+            <a:r>
+              <a:rPr lang="en-US" b="1" dirty="0" smtClean="0"/>
+              <a:t>stack</a:t>
             </a:r>
             <a:endParaRPr lang="en-GB" dirty="0"/>
           </a:p>
@@ -4769,69 +4359,53 @@
             <p:ph idx="1"/>
           </p:nvPr>
         </p:nvSpPr>
-        <p:spPr>
-          <a:xfrm>
-            <a:off x="35496" y="1628800"/>
-            <a:ext cx="8729134" cy="3894026"/>
-          </a:xfrm>
-        </p:spPr>
-        <p:txBody>
-          <a:bodyPr/>
+        <p:spPr/>
+        <p:txBody>
+          <a:bodyPr>
+            <a:normAutofit/>
+          </a:bodyPr>
           <a:lstStyle/>
           <a:p>
             <a:r>
+              <a:rPr lang="en-US" dirty="0" smtClean="0"/>
+              <a:t>Significant </a:t>
+            </a:r>
+            <a:r>
               <a:rPr lang="en-US" dirty="0"/>
-              <a:t>Because the customizations are rendered in the current page DOM and not in an IFRAME, they will not have the same baggage associated with them as IFRAMES have. One of the biggest benefits to this is that the customizations will be responsive and accessible by nature.</a:t>
+              <a:t>break from the </a:t>
+            </a:r>
+            <a:r>
+              <a:rPr lang="en-US" dirty="0" smtClean="0"/>
+              <a:t>past</a:t>
+            </a:r>
+          </a:p>
+          <a:p>
+            <a:r>
+              <a:rPr lang="en-US" dirty="0"/>
+              <a:t>Traditional SharePoint developers are used to using tools like Visual Studio to create SharePoint solutions or add-ins</a:t>
+            </a:r>
+            <a:r>
+              <a:rPr lang="en-US" dirty="0" smtClean="0"/>
+              <a:t>.</a:t>
+            </a:r>
+          </a:p>
+          <a:p>
+            <a:r>
+              <a:rPr lang="en-US" dirty="0"/>
+              <a:t>This approach opens the platform up to more developers because it is not limited to </a:t>
+            </a:r>
+            <a:r>
+              <a:rPr lang="en-US" dirty="0" smtClean="0"/>
+              <a:t>Windows</a:t>
             </a:r>
             <a:endParaRPr lang="en-GB" dirty="0"/>
           </a:p>
         </p:txBody>
       </p:sp>
-      <p:pic>
-        <p:nvPicPr>
-          <p:cNvPr id="5122" name="Picture 2" descr="Image result for Customizations responsive &amp; accessible spfx"/>
-          <p:cNvPicPr>
-            <a:picLocks noChangeAspect="1" noChangeArrowheads="1"/>
-          </p:cNvPicPr>
-          <p:nvPr/>
-        </p:nvPicPr>
-        <p:blipFill>
-          <a:blip r:embed="rId2">
-            <a:extLst>
-              <a:ext uri="{28A0092B-C50C-407E-A947-70E740481C1C}">
-                <a14:useLocalDpi xmlns:a14="http://schemas.microsoft.com/office/drawing/2010/main" val="0"/>
-              </a:ext>
-            </a:extLst>
-          </a:blip>
-          <a:srcRect/>
-          <a:stretch>
-            <a:fillRect/>
-          </a:stretch>
-        </p:blipFill>
-        <p:spPr bwMode="auto">
-          <a:xfrm>
-            <a:off x="2339752" y="4850098"/>
-            <a:ext cx="3429000" cy="1928813"/>
-          </a:xfrm>
-          <a:prstGeom prst="rect">
-            <a:avLst/>
-          </a:prstGeom>
-          <a:noFill/>
-          <a:extLst>
-            <a:ext uri="{909E8E84-426E-40DD-AFC4-6F175D3DCCD1}">
-              <a14:hiddenFill xmlns:a14="http://schemas.microsoft.com/office/drawing/2010/main">
-                <a:solidFill>
-                  <a:srgbClr val="FFFFFF"/>
-                </a:solidFill>
-              </a14:hiddenFill>
-            </a:ext>
-          </a:extLst>
-        </p:spPr>
-      </p:pic>
     </p:spTree>
     <p:extLst>
       <p:ext uri="{BB962C8B-B14F-4D97-AF65-F5344CB8AC3E}">
-        <p14:creationId xmlns:p14="http://schemas.microsoft.com/office/powerpoint/2010/main" val="1780065308"/>
+        <p14:creationId xmlns:p14="http://schemas.microsoft.com/office/powerpoint/2010/main" val="198723744"/>
       </p:ext>
     </p:extLst>
   </p:cSld>
@@ -4877,84 +4451,64 @@
         </p:nvSpPr>
         <p:spPr/>
         <p:txBody>
+          <a:bodyPr/>
+          <a:lstStyle/>
+          <a:p>
+            <a:r>
+              <a:rPr lang="en-GB" b="1" dirty="0"/>
+              <a:t>First Party &amp; Third </a:t>
+            </a:r>
+            <a:r>
+              <a:rPr lang="en-GB" b="1" dirty="0" smtClean="0"/>
+              <a:t>Party</a:t>
+            </a:r>
+            <a:endParaRPr lang="en-GB" dirty="0"/>
+          </a:p>
+        </p:txBody>
+      </p:sp>
+      <p:sp>
+        <p:nvSpPr>
+          <p:cNvPr id="3" name="Content Placeholder 2"/>
+          <p:cNvSpPr>
+            <a:spLocks noGrp="1"/>
+          </p:cNvSpPr>
+          <p:nvPr>
+            <p:ph idx="1"/>
+          </p:nvPr>
+        </p:nvSpPr>
+        <p:spPr/>
+        <p:txBody>
           <a:bodyPr>
-            <a:normAutofit fontScale="90000"/>
+            <a:normAutofit/>
           </a:bodyPr>
           <a:lstStyle/>
           <a:p>
             <a:r>
-              <a:rPr lang="en-US" b="1" dirty="0"/>
-              <a:t>Development experience embraces web development </a:t>
-            </a:r>
-            <a:r>
-              <a:rPr lang="en-US" b="1" dirty="0" smtClean="0"/>
-              <a:t>stack</a:t>
-            </a:r>
-            <a:endParaRPr lang="en-GB" dirty="0"/>
-          </a:p>
-        </p:txBody>
-      </p:sp>
-      <p:sp>
-        <p:nvSpPr>
-          <p:cNvPr id="3" name="Content Placeholder 2"/>
-          <p:cNvSpPr>
-            <a:spLocks noGrp="1"/>
-          </p:cNvSpPr>
-          <p:nvPr>
-            <p:ph idx="1"/>
-          </p:nvPr>
-        </p:nvSpPr>
-        <p:spPr/>
-        <p:txBody>
-          <a:bodyPr>
-            <a:normAutofit fontScale="85000" lnSpcReduction="20000"/>
-          </a:bodyPr>
-          <a:lstStyle/>
-          <a:p>
-            <a:r>
-              <a:rPr lang="en-US" dirty="0" smtClean="0"/>
-              <a:t>Significant </a:t>
-            </a:r>
-            <a:r>
-              <a:rPr lang="en-US" dirty="0"/>
-              <a:t>break from the </a:t>
-            </a:r>
-            <a:r>
-              <a:rPr lang="en-US" dirty="0" smtClean="0"/>
-              <a:t>past</a:t>
-            </a:r>
-          </a:p>
-          <a:p>
-            <a:r>
-              <a:rPr lang="en-US" dirty="0"/>
-              <a:t>Traditional SharePoint developers are used to using tools like Visual Studio to create SharePoint solutions or add-ins</a:t>
-            </a:r>
-            <a:r>
-              <a:rPr lang="en-US" dirty="0" smtClean="0"/>
-              <a:t>.</a:t>
-            </a:r>
-          </a:p>
-          <a:p>
-            <a:r>
-              <a:rPr lang="en-US" dirty="0"/>
-              <a:t>This approach opens the platform up to more developers because it is not limited to Windows; the tools are cross platform. You can use any text editor you prefer. Popular open source tools are used to solve different parts of the build toolchain from project scaffolding, building, serving, packaging all the way to deploying. This includes tools like Yeoman, gulp and </a:t>
-            </a:r>
-            <a:r>
-              <a:rPr lang="en-US" dirty="0" err="1"/>
-              <a:t>webpack</a:t>
-            </a:r>
-            <a:r>
-              <a:rPr lang="en-US" dirty="0"/>
-              <a:t>, runtimes like Node.js, package managers like NPM and editors like Visual Studio Code or Sublime.</a:t>
-            </a:r>
-            <a:endParaRPr lang="en-GB" dirty="0"/>
+              <a:rPr lang="en-US" sz="2400" dirty="0"/>
+              <a:t>Microsoft vs </a:t>
+            </a:r>
+            <a:r>
+              <a:rPr lang="en-US" sz="2400" dirty="0" smtClean="0"/>
+              <a:t>Others</a:t>
+            </a:r>
+            <a:r>
+              <a:rPr lang="sr-Latn-RS" sz="2400" dirty="0" smtClean="0"/>
+              <a:t> (kako je pisan SP FrameWork </a:t>
+            </a:r>
+          </a:p>
+          <a:p>
+            <a:r>
+              <a:rPr lang="sr-Latn-RS" sz="2400" dirty="0" smtClean="0"/>
+              <a:t>Ili da li smo u istoj poziciji kao Microsoft programeri?</a:t>
+            </a:r>
+            <a:endParaRPr lang="en-GB" sz="2400" dirty="0"/>
           </a:p>
         </p:txBody>
       </p:sp>
     </p:spTree>
     <p:extLst>
       <p:ext uri="{BB962C8B-B14F-4D97-AF65-F5344CB8AC3E}">
-        <p14:creationId xmlns:p14="http://schemas.microsoft.com/office/powerpoint/2010/main" val="198723744"/>
+        <p14:creationId xmlns:p14="http://schemas.microsoft.com/office/powerpoint/2010/main" val="3383627701"/>
       </p:ext>
     </p:extLst>
   </p:cSld>
@@ -4990,95 +4544,6 @@
       </p:grpSpPr>
       <p:sp>
         <p:nvSpPr>
-          <p:cNvPr id="2" name="Title 1"/>
-          <p:cNvSpPr>
-            <a:spLocks noGrp="1"/>
-          </p:cNvSpPr>
-          <p:nvPr>
-            <p:ph type="title"/>
-          </p:nvPr>
-        </p:nvSpPr>
-        <p:spPr/>
-        <p:txBody>
-          <a:bodyPr/>
-          <a:lstStyle/>
-          <a:p>
-            <a:r>
-              <a:rPr lang="en-GB" b="1" dirty="0"/>
-              <a:t>First Party &amp; Third </a:t>
-            </a:r>
-            <a:r>
-              <a:rPr lang="en-GB" b="1" dirty="0" smtClean="0"/>
-              <a:t>Party</a:t>
-            </a:r>
-            <a:endParaRPr lang="en-GB" dirty="0"/>
-          </a:p>
-        </p:txBody>
-      </p:sp>
-      <p:sp>
-        <p:nvSpPr>
-          <p:cNvPr id="3" name="Content Placeholder 2"/>
-          <p:cNvSpPr>
-            <a:spLocks noGrp="1"/>
-          </p:cNvSpPr>
-          <p:nvPr>
-            <p:ph idx="1"/>
-          </p:nvPr>
-        </p:nvSpPr>
-        <p:spPr/>
-        <p:txBody>
-          <a:bodyPr>
-            <a:normAutofit/>
-          </a:bodyPr>
-          <a:lstStyle/>
-          <a:p>
-            <a:r>
-              <a:rPr lang="en-US" sz="2400" dirty="0"/>
-              <a:t>Microsoft vs Others</a:t>
-            </a:r>
-            <a:endParaRPr lang="en-GB" sz="2400" dirty="0"/>
-          </a:p>
-        </p:txBody>
-      </p:sp>
-    </p:spTree>
-    <p:extLst>
-      <p:ext uri="{BB962C8B-B14F-4D97-AF65-F5344CB8AC3E}">
-        <p14:creationId xmlns:p14="http://schemas.microsoft.com/office/powerpoint/2010/main" val="3383627701"/>
-      </p:ext>
-    </p:extLst>
-  </p:cSld>
-  <p:clrMapOvr>
-    <a:masterClrMapping/>
-  </p:clrMapOvr>
-  <p:timing>
-    <p:tnLst>
-      <p:par>
-        <p:cTn id="1" dur="indefinite" restart="never" nodeType="tmRoot"/>
-      </p:par>
-    </p:tnLst>
-  </p:timing>
-</p:sld>
-</file>
-
-<file path=ppt/slides/slide13.xml><?xml version="1.0" encoding="utf-8"?>
-<p:sld xmlns:a="http://schemas.openxmlformats.org/drawingml/2006/main" xmlns:r="http://schemas.openxmlformats.org/officeDocument/2006/relationships" xmlns:p="http://schemas.openxmlformats.org/presentationml/2006/main">
-  <p:cSld>
-    <p:spTree>
-      <p:nvGrpSpPr>
-        <p:cNvPr id="1" name=""/>
-        <p:cNvGrpSpPr/>
-        <p:nvPr/>
-      </p:nvGrpSpPr>
-      <p:grpSpPr>
-        <a:xfrm>
-          <a:off x="0" y="0"/>
-          <a:ext cx="0" cy="0"/>
-          <a:chOff x="0" y="0"/>
-          <a:chExt cx="0" cy="0"/>
-        </a:xfrm>
-      </p:grpSpPr>
-      <p:sp>
-        <p:nvSpPr>
           <p:cNvPr id="6" name="TextBox 5"/>
           <p:cNvSpPr txBox="1"/>
           <p:nvPr/>
@@ -5223,6 +4688,96 @@
 </p:sld>
 </file>
 
+<file path=ppt/slides/slide13.xml><?xml version="1.0" encoding="utf-8"?>
+<p:sld xmlns:a="http://schemas.openxmlformats.org/drawingml/2006/main" xmlns:r="http://schemas.openxmlformats.org/officeDocument/2006/relationships" xmlns:p="http://schemas.openxmlformats.org/presentationml/2006/main">
+  <p:cSld>
+    <p:spTree>
+      <p:nvGrpSpPr>
+        <p:cNvPr id="1" name=""/>
+        <p:cNvGrpSpPr/>
+        <p:nvPr/>
+      </p:nvGrpSpPr>
+      <p:grpSpPr>
+        <a:xfrm>
+          <a:off x="0" y="0"/>
+          <a:ext cx="0" cy="0"/>
+          <a:chOff x="0" y="0"/>
+          <a:chExt cx="0" cy="0"/>
+        </a:xfrm>
+      </p:grpSpPr>
+      <p:sp>
+        <p:nvSpPr>
+          <p:cNvPr id="2" name="Title 1"/>
+          <p:cNvSpPr>
+            <a:spLocks noGrp="1"/>
+          </p:cNvSpPr>
+          <p:nvPr>
+            <p:ph type="title"/>
+          </p:nvPr>
+        </p:nvSpPr>
+        <p:spPr/>
+        <p:txBody>
+          <a:bodyPr/>
+          <a:lstStyle/>
+          <a:p>
+            <a:r>
+              <a:rPr lang="en-US" dirty="0" err="1" smtClean="0"/>
+              <a:t>SpFx</a:t>
+            </a:r>
+            <a:r>
+              <a:rPr lang="en-US" dirty="0" smtClean="0"/>
+              <a:t> vs Farm Solutions</a:t>
+            </a:r>
+            <a:endParaRPr lang="en-GB" dirty="0"/>
+          </a:p>
+        </p:txBody>
+      </p:sp>
+      <p:pic>
+        <p:nvPicPr>
+          <p:cNvPr id="4" name="Content Placeholder 3"/>
+          <p:cNvPicPr>
+            <a:picLocks noGrp="1" noChangeAspect="1"/>
+          </p:cNvPicPr>
+          <p:nvPr>
+            <p:ph idx="1"/>
+          </p:nvPr>
+        </p:nvPicPr>
+        <p:blipFill>
+          <a:blip r:embed="rId2"/>
+          <a:stretch>
+            <a:fillRect/>
+          </a:stretch>
+        </p:blipFill>
+        <p:spPr>
+          <a:xfrm>
+            <a:off x="-23256" y="1700808"/>
+            <a:ext cx="8934676" cy="3312368"/>
+          </a:xfrm>
+          <a:prstGeom prst="rect">
+            <a:avLst/>
+          </a:prstGeom>
+        </p:spPr>
+      </p:pic>
+    </p:spTree>
+    <p:extLst>
+      <p:ext uri="{BB962C8B-B14F-4D97-AF65-F5344CB8AC3E}">
+        <p14:creationId xmlns:p14="http://schemas.microsoft.com/office/powerpoint/2010/main" val="3184108287"/>
+      </p:ext>
+    </p:extLst>
+  </p:cSld>
+  <p:clrMapOvr>
+    <a:masterClrMapping/>
+  </p:clrMapOvr>
+  <p:timing>
+    <p:tnLst>
+      <p:par>
+        <p:cTn id="1" dur="indefinite" restart="never" nodeType="tmRoot"/>
+      </p:par>
+    </p:tnLst>
+  </p:timing>
+</p:sld>
+</file>
+
 <file path=ppt/slides/slide14.xml><?xml version="1.0" encoding="utf-8"?>
 <p:sld xmlns:a="http://schemas.openxmlformats.org/drawingml/2006/main" xmlns:r="http://schemas.openxmlformats.org/officeDocument/2006/relationships" xmlns:p="http://schemas.openxmlformats.org/presentationml/2006/main">
   <p:cSld>
@@ -5261,7 +4816,7 @@
             </a:r>
             <a:r>
               <a:rPr lang="en-US" dirty="0" smtClean="0"/>
-              <a:t> vs Farm Solutions</a:t>
+              <a:t> vs SharePoint Add-ins</a:t>
             </a:r>
             <a:endParaRPr lang="en-GB" dirty="0"/>
           </a:p>
@@ -5269,13 +4824,11 @@
       </p:sp>
       <p:pic>
         <p:nvPicPr>
-          <p:cNvPr id="4" name="Content Placeholder 3"/>
+          <p:cNvPr id="5" name="Picture 4"/>
           <p:cNvPicPr>
-            <a:picLocks noGrp="1" noChangeAspect="1"/>
+            <a:picLocks noChangeAspect="1"/>
           </p:cNvPicPr>
-          <p:nvPr>
-            <p:ph idx="1"/>
-          </p:nvPr>
+          <p:nvPr/>
         </p:nvPicPr>
         <p:blipFill>
           <a:blip r:embed="rId2"/>
@@ -5285,8 +4838,8 @@
         </p:blipFill>
         <p:spPr>
           <a:xfrm>
-            <a:off x="369623" y="2150609"/>
-            <a:ext cx="8404754" cy="3115909"/>
+            <a:off x="179512" y="1772816"/>
+            <a:ext cx="8679330" cy="3528392"/>
           </a:xfrm>
           <a:prstGeom prst="rect">
             <a:avLst/>
@@ -5296,7 +4849,7 @@
     </p:spTree>
     <p:extLst>
       <p:ext uri="{BB962C8B-B14F-4D97-AF65-F5344CB8AC3E}">
-        <p14:creationId xmlns:p14="http://schemas.microsoft.com/office/powerpoint/2010/main" val="3184108287"/>
+        <p14:creationId xmlns:p14="http://schemas.microsoft.com/office/powerpoint/2010/main" val="3927380420"/>
       </p:ext>
     </p:extLst>
   </p:cSld>
@@ -5332,113 +4885,6 @@
       </p:grpSpPr>
       <p:sp>
         <p:nvSpPr>
-          <p:cNvPr id="2" name="Title 1"/>
-          <p:cNvSpPr>
-            <a:spLocks noGrp="1"/>
-          </p:cNvSpPr>
-          <p:nvPr>
-            <p:ph type="title"/>
-          </p:nvPr>
-        </p:nvSpPr>
-        <p:spPr/>
-        <p:txBody>
-          <a:bodyPr/>
-          <a:lstStyle/>
-          <a:p>
-            <a:r>
-              <a:rPr lang="en-US" dirty="0" err="1" smtClean="0"/>
-              <a:t>SpFx</a:t>
-            </a:r>
-            <a:r>
-              <a:rPr lang="en-US" dirty="0" smtClean="0"/>
-              <a:t> vs SharePoint Add-ins</a:t>
-            </a:r>
-            <a:endParaRPr lang="en-GB" dirty="0"/>
-          </a:p>
-        </p:txBody>
-      </p:sp>
-      <p:sp>
-        <p:nvSpPr>
-          <p:cNvPr id="3" name="Content Placeholder 2"/>
-          <p:cNvSpPr>
-            <a:spLocks noGrp="1"/>
-          </p:cNvSpPr>
-          <p:nvPr>
-            <p:ph idx="1"/>
-          </p:nvPr>
-        </p:nvSpPr>
-        <p:spPr/>
-        <p:txBody>
-          <a:bodyPr/>
-          <a:lstStyle/>
-          <a:p>
-            <a:endParaRPr lang="en-GB" dirty="0"/>
-          </a:p>
-        </p:txBody>
-      </p:sp>
-      <p:pic>
-        <p:nvPicPr>
-          <p:cNvPr id="5" name="Picture 4"/>
-          <p:cNvPicPr>
-            <a:picLocks noChangeAspect="1"/>
-          </p:cNvPicPr>
-          <p:nvPr/>
-        </p:nvPicPr>
-        <p:blipFill>
-          <a:blip r:embed="rId2"/>
-          <a:stretch>
-            <a:fillRect/>
-          </a:stretch>
-        </p:blipFill>
-        <p:spPr>
-          <a:xfrm>
-            <a:off x="296333" y="2032000"/>
-            <a:ext cx="8051007" cy="3272961"/>
-          </a:xfrm>
-          <a:prstGeom prst="rect">
-            <a:avLst/>
-          </a:prstGeom>
-        </p:spPr>
-      </p:pic>
-    </p:spTree>
-    <p:extLst>
-      <p:ext uri="{BB962C8B-B14F-4D97-AF65-F5344CB8AC3E}">
-        <p14:creationId xmlns:p14="http://schemas.microsoft.com/office/powerpoint/2010/main" val="3927380420"/>
-      </p:ext>
-    </p:extLst>
-  </p:cSld>
-  <p:clrMapOvr>
-    <a:masterClrMapping/>
-  </p:clrMapOvr>
-  <p:timing>
-    <p:tnLst>
-      <p:par>
-        <p:cTn id="1" dur="indefinite" restart="never" nodeType="tmRoot"/>
-      </p:par>
-    </p:tnLst>
-  </p:timing>
-</p:sld>
-</file>
-
-<file path=ppt/slides/slide16.xml><?xml version="1.0" encoding="utf-8"?>
-<p:sld xmlns:a="http://schemas.openxmlformats.org/drawingml/2006/main" xmlns:r="http://schemas.openxmlformats.org/officeDocument/2006/relationships" xmlns:p="http://schemas.openxmlformats.org/presentationml/2006/main">
-  <p:cSld>
-    <p:spTree>
-      <p:nvGrpSpPr>
-        <p:cNvPr id="1" name=""/>
-        <p:cNvGrpSpPr/>
-        <p:nvPr/>
-      </p:nvGrpSpPr>
-      <p:grpSpPr>
-        <a:xfrm>
-          <a:off x="0" y="0"/>
-          <a:ext cx="0" cy="0"/>
-          <a:chOff x="0" y="0"/>
-          <a:chExt cx="0" cy="0"/>
-        </a:xfrm>
-      </p:grpSpPr>
-      <p:sp>
-        <p:nvSpPr>
           <p:cNvPr id="4" name="Text Placeholder 3"/>
           <p:cNvSpPr>
             <a:spLocks noGrp="1"/>
@@ -5492,7 +4938,7 @@
 </p:sld>
 </file>
 
-<file path=ppt/slides/slide17.xml><?xml version="1.0" encoding="utf-8"?>
+<file path=ppt/slides/slide16.xml><?xml version="1.0" encoding="utf-8"?>
 <p:sld xmlns:a="http://schemas.openxmlformats.org/drawingml/2006/main" xmlns:r="http://schemas.openxmlformats.org/officeDocument/2006/relationships" xmlns:p="http://schemas.openxmlformats.org/presentationml/2006/main">
   <p:cSld>
     <p:spTree>
@@ -5578,7 +5024,7 @@
 </p:sld>
 </file>
 
-<file path=ppt/slides/slide18.xml><?xml version="1.0" encoding="utf-8"?>
+<file path=ppt/slides/slide17.xml><?xml version="1.0" encoding="utf-8"?>
 <p:sld xmlns:a="http://schemas.openxmlformats.org/drawingml/2006/main" xmlns:r="http://schemas.openxmlformats.org/officeDocument/2006/relationships" xmlns:p="http://schemas.openxmlformats.org/presentationml/2006/main">
   <p:cSld>
     <p:spTree>
@@ -5804,7 +5250,7 @@
 </p:sld>
 </file>
 
-<file path=ppt/slides/slide19.xml><?xml version="1.0" encoding="utf-8"?>
+<file path=ppt/slides/slide18.xml><?xml version="1.0" encoding="utf-8"?>
 <p:sld xmlns:a="http://schemas.openxmlformats.org/drawingml/2006/main" xmlns:r="http://schemas.openxmlformats.org/officeDocument/2006/relationships" xmlns:p="http://schemas.openxmlformats.org/presentationml/2006/main">
   <p:cSld>
     <p:spTree>
@@ -6904,6 +6350,107 @@
 </p:sld>
 </file>
 
+<file path=ppt/slides/slide19.xml><?xml version="1.0" encoding="utf-8"?>
+<p:sld xmlns:a="http://schemas.openxmlformats.org/drawingml/2006/main" xmlns:r="http://schemas.openxmlformats.org/officeDocument/2006/relationships" xmlns:p="http://schemas.openxmlformats.org/presentationml/2006/main">
+  <p:cSld>
+    <p:spTree>
+      <p:nvGrpSpPr>
+        <p:cNvPr id="1" name=""/>
+        <p:cNvGrpSpPr/>
+        <p:nvPr/>
+      </p:nvGrpSpPr>
+      <p:grpSpPr>
+        <a:xfrm>
+          <a:off x="0" y="0"/>
+          <a:ext cx="0" cy="0"/>
+          <a:chOff x="0" y="0"/>
+          <a:chExt cx="0" cy="0"/>
+        </a:xfrm>
+      </p:grpSpPr>
+      <p:sp>
+        <p:nvSpPr>
+          <p:cNvPr id="4" name="Text Placeholder 3"/>
+          <p:cNvSpPr>
+            <a:spLocks noGrp="1"/>
+          </p:cNvSpPr>
+          <p:nvPr>
+            <p:ph type="body" sz="quarter" idx="11"/>
+          </p:nvPr>
+        </p:nvSpPr>
+        <p:spPr/>
+        <p:txBody>
+          <a:bodyPr/>
+          <a:lstStyle/>
+          <a:p>
+            <a:r>
+              <a:rPr lang="en-US" sz="4050" dirty="0"/>
+              <a:t>Demo – Hello World </a:t>
+            </a:r>
+          </a:p>
+          <a:p>
+            <a:pPr marL="514350" indent="-514350">
+              <a:buFont typeface="Arial" panose="020B0604020202020204" pitchFamily="34" charset="0"/>
+              <a:buChar char="•"/>
+            </a:pPr>
+            <a:r>
+              <a:rPr lang="en-US" sz="4050" dirty="0"/>
+              <a:t>from the local </a:t>
+            </a:r>
+            <a:r>
+              <a:rPr lang="sr-Latn-RS" sz="4050" dirty="0"/>
+              <a:t>W</a:t>
+            </a:r>
+            <a:r>
+              <a:rPr lang="en-US" sz="4050" dirty="0" err="1"/>
+              <a:t>orkbench</a:t>
+            </a:r>
+            <a:endParaRPr lang="en-US" sz="4050" dirty="0"/>
+          </a:p>
+          <a:p>
+            <a:pPr marL="514350" indent="-514350">
+              <a:buFont typeface="Arial" panose="020B0604020202020204" pitchFamily="34" charset="0"/>
+              <a:buChar char="•"/>
+            </a:pPr>
+            <a:r>
+              <a:rPr lang="en-US" sz="4050" dirty="0"/>
+              <a:t>from the Cloud</a:t>
+            </a:r>
+            <a:endParaRPr lang="en-CA" sz="4050" dirty="0"/>
+          </a:p>
+        </p:txBody>
+      </p:sp>
+    </p:spTree>
+    <p:extLst>
+      <p:ext uri="{BB962C8B-B14F-4D97-AF65-F5344CB8AC3E}">
+        <p14:creationId xmlns:p14="http://schemas.microsoft.com/office/powerpoint/2010/main" val="3920052671"/>
+      </p:ext>
+    </p:extLst>
+  </p:cSld>
+  <p:clrMapOvr>
+    <a:masterClrMapping/>
+  </p:clrMapOvr>
+  <mc:AlternateContent xmlns:mc="http://schemas.openxmlformats.org/markup-compatibility/2006" xmlns:p14="http://schemas.microsoft.com/office/powerpoint/2010/main">
+    <mc:Choice Requires="p14">
+      <p:transition spd="slow" p14:dur="1600">
+        <p14:gallery dir="l"/>
+      </p:transition>
+    </mc:Choice>
+    <mc:Fallback xmlns="">
+      <p:transition spd="slow">
+        <p:fade/>
+      </p:transition>
+    </mc:Fallback>
+  </mc:AlternateContent>
+  <p:timing>
+    <p:tnLst>
+      <p:par>
+        <p:cTn id="1" dur="indefinite" restart="never" nodeType="tmRoot"/>
+      </p:par>
+    </p:tnLst>
+  </p:timing>
+</p:sld>
+</file>
+
 <file path=ppt/slides/slide2.xml><?xml version="1.0" encoding="utf-8"?>
 <p:sld xmlns:a="http://schemas.openxmlformats.org/drawingml/2006/main" xmlns:r="http://schemas.openxmlformats.org/officeDocument/2006/relationships" xmlns:p="http://schemas.openxmlformats.org/presentationml/2006/main">
   <p:cSld>
@@ -6972,6 +6519,14 @@
             <a:r>
               <a:rPr lang="sr-Latn-RS" dirty="0" smtClean="0"/>
               <a:t>ć</a:t>
+            </a:r>
+            <a:r>
+              <a:rPr lang="en-US" dirty="0" smtClean="0"/>
+              <a:t>, </a:t>
+            </a:r>
+            <a:r>
+              <a:rPr lang="sr-Latn-RS" dirty="0" smtClean="0"/>
+              <a:t>Čika Rade</a:t>
             </a:r>
           </a:p>
           <a:p>
@@ -7025,425 +6580,6 @@
       </p:grpSpPr>
       <p:sp>
         <p:nvSpPr>
-          <p:cNvPr id="3" name="Title 2"/>
-          <p:cNvSpPr>
-            <a:spLocks noGrp="1"/>
-          </p:cNvSpPr>
-          <p:nvPr>
-            <p:ph type="title"/>
-          </p:nvPr>
-        </p:nvSpPr>
-        <p:spPr/>
-        <p:txBody>
-          <a:bodyPr/>
-          <a:lstStyle/>
-          <a:p>
-            <a:r>
-              <a:rPr lang="en-US" dirty="0"/>
-              <a:t>You NEED to know NPM and </a:t>
-            </a:r>
-            <a:r>
-              <a:rPr lang="en-US" dirty="0" err="1"/>
-              <a:t>TypeScript</a:t>
-            </a:r>
-            <a:endParaRPr lang="en-GB" dirty="0"/>
-          </a:p>
-        </p:txBody>
-      </p:sp>
-      <p:pic>
-        <p:nvPicPr>
-          <p:cNvPr id="7172" name="Picture 4" descr="https://s3.amazonaws.com/kajabi-storefronts-production/blogs/3971/images/b2W8u3mNTiy6n2gGmn5t_nodejs-new-pantone-black.png"/>
-          <p:cNvPicPr>
-            <a:picLocks noChangeAspect="1" noChangeArrowheads="1"/>
-          </p:cNvPicPr>
-          <p:nvPr/>
-        </p:nvPicPr>
-        <p:blipFill>
-          <a:blip r:embed="rId3" cstate="print">
-            <a:extLst>
-              <a:ext uri="{28A0092B-C50C-407E-A947-70E740481C1C}">
-                <a14:useLocalDpi xmlns:a14="http://schemas.microsoft.com/office/drawing/2010/main" val="0"/>
-              </a:ext>
-            </a:extLst>
-          </a:blip>
-          <a:srcRect/>
-          <a:stretch>
-            <a:fillRect/>
-          </a:stretch>
-        </p:blipFill>
-        <p:spPr bwMode="auto">
-          <a:xfrm>
-            <a:off x="5017725" y="2089626"/>
-            <a:ext cx="2227568" cy="1366241"/>
-          </a:xfrm>
-          <a:prstGeom prst="rect">
-            <a:avLst/>
-          </a:prstGeom>
-          <a:noFill/>
-          <a:extLst>
-            <a:ext uri="{909E8E84-426E-40DD-AFC4-6F175D3DCCD1}">
-              <a14:hiddenFill xmlns:a14="http://schemas.microsoft.com/office/drawing/2010/main">
-                <a:solidFill>
-                  <a:srgbClr val="FFFFFF"/>
-                </a:solidFill>
-              </a14:hiddenFill>
-            </a:ext>
-          </a:extLst>
-        </p:spPr>
-      </p:pic>
-      <p:pic>
-        <p:nvPicPr>
-          <p:cNvPr id="7174" name="Picture 6" descr="https://s3.amazonaws.com/kajabi-storefronts-production/blogs/3971/images/9njQKn5RieXawYxCauxA_npm.png"/>
-          <p:cNvPicPr>
-            <a:picLocks noChangeAspect="1" noChangeArrowheads="1"/>
-          </p:cNvPicPr>
-          <p:nvPr/>
-        </p:nvPicPr>
-        <p:blipFill>
-          <a:blip r:embed="rId4">
-            <a:extLst>
-              <a:ext uri="{28A0092B-C50C-407E-A947-70E740481C1C}">
-                <a14:useLocalDpi xmlns:a14="http://schemas.microsoft.com/office/drawing/2010/main" val="0"/>
-              </a:ext>
-            </a:extLst>
-          </a:blip>
-          <a:srcRect/>
-          <a:stretch>
-            <a:fillRect/>
-          </a:stretch>
-        </p:blipFill>
-        <p:spPr bwMode="auto">
-          <a:xfrm>
-            <a:off x="528162" y="4324354"/>
-            <a:ext cx="3140869" cy="1235409"/>
-          </a:xfrm>
-          <a:prstGeom prst="rect">
-            <a:avLst/>
-          </a:prstGeom>
-          <a:noFill/>
-          <a:extLst>
-            <a:ext uri="{909E8E84-426E-40DD-AFC4-6F175D3DCCD1}">
-              <a14:hiddenFill xmlns:a14="http://schemas.microsoft.com/office/drawing/2010/main">
-                <a:solidFill>
-                  <a:srgbClr val="FFFFFF"/>
-                </a:solidFill>
-              </a14:hiddenFill>
-            </a:ext>
-          </a:extLst>
-        </p:spPr>
-      </p:pic>
-      <p:pic>
-        <p:nvPicPr>
-          <p:cNvPr id="7176" name="Picture 8" descr="https://encrypted-tbn0.gstatic.com/images?q=tbn:ANd9GcRTWMHuVQjg1RoYk-YKVcWv41yAm_wr7TonsgKlJPCZiYkJcCWts7WBxNPB"/>
-          <p:cNvPicPr>
-            <a:picLocks noChangeAspect="1" noChangeArrowheads="1"/>
-          </p:cNvPicPr>
-          <p:nvPr/>
-        </p:nvPicPr>
-        <p:blipFill>
-          <a:blip r:embed="rId5">
-            <a:extLst>
-              <a:ext uri="{28A0092B-C50C-407E-A947-70E740481C1C}">
-                <a14:useLocalDpi xmlns:a14="http://schemas.microsoft.com/office/drawing/2010/main" val="0"/>
-              </a:ext>
-            </a:extLst>
-          </a:blip>
-          <a:srcRect/>
-          <a:stretch>
-            <a:fillRect/>
-          </a:stretch>
-        </p:blipFill>
-        <p:spPr bwMode="auto">
-          <a:xfrm>
-            <a:off x="528162" y="2549803"/>
-            <a:ext cx="1607344" cy="1607344"/>
-          </a:xfrm>
-          <a:prstGeom prst="rect">
-            <a:avLst/>
-          </a:prstGeom>
-          <a:noFill/>
-          <a:extLst>
-            <a:ext uri="{909E8E84-426E-40DD-AFC4-6F175D3DCCD1}">
-              <a14:hiddenFill xmlns:a14="http://schemas.microsoft.com/office/drawing/2010/main">
-                <a:solidFill>
-                  <a:srgbClr val="FFFFFF"/>
-                </a:solidFill>
-              </a14:hiddenFill>
-            </a:ext>
-          </a:extLst>
-        </p:spPr>
-      </p:pic>
-      <p:pic>
-        <p:nvPicPr>
-          <p:cNvPr id="7178" name="Picture 10" descr="Image result for yeoman"/>
-          <p:cNvPicPr>
-            <a:picLocks noChangeAspect="1" noChangeArrowheads="1"/>
-          </p:cNvPicPr>
-          <p:nvPr/>
-        </p:nvPicPr>
-        <p:blipFill>
-          <a:blip r:embed="rId6" cstate="print">
-            <a:extLst>
-              <a:ext uri="{28A0092B-C50C-407E-A947-70E740481C1C}">
-                <a14:useLocalDpi xmlns:a14="http://schemas.microsoft.com/office/drawing/2010/main" val="0"/>
-              </a:ext>
-            </a:extLst>
-          </a:blip>
-          <a:srcRect/>
-          <a:stretch>
-            <a:fillRect/>
-          </a:stretch>
-        </p:blipFill>
-        <p:spPr bwMode="auto">
-          <a:xfrm>
-            <a:off x="5073479" y="3455866"/>
-            <a:ext cx="2171814" cy="917405"/>
-          </a:xfrm>
-          <a:prstGeom prst="rect">
-            <a:avLst/>
-          </a:prstGeom>
-          <a:noFill/>
-          <a:extLst>
-            <a:ext uri="{909E8E84-426E-40DD-AFC4-6F175D3DCCD1}">
-              <a14:hiddenFill xmlns:a14="http://schemas.microsoft.com/office/drawing/2010/main">
-                <a:solidFill>
-                  <a:srgbClr val="FFFFFF"/>
-                </a:solidFill>
-              </a14:hiddenFill>
-            </a:ext>
-          </a:extLst>
-        </p:spPr>
-      </p:pic>
-      <p:pic>
-        <p:nvPicPr>
-          <p:cNvPr id="7180" name="Picture 12" descr="Image result for gulp"/>
-          <p:cNvPicPr>
-            <a:picLocks noChangeAspect="1" noChangeArrowheads="1"/>
-          </p:cNvPicPr>
-          <p:nvPr/>
-        </p:nvPicPr>
-        <p:blipFill>
-          <a:blip r:embed="rId7" cstate="print">
-            <a:extLst>
-              <a:ext uri="{28A0092B-C50C-407E-A947-70E740481C1C}">
-                <a14:useLocalDpi xmlns:a14="http://schemas.microsoft.com/office/drawing/2010/main" val="0"/>
-              </a:ext>
-            </a:extLst>
-          </a:blip>
-          <a:srcRect/>
-          <a:stretch>
-            <a:fillRect/>
-          </a:stretch>
-        </p:blipFill>
-        <p:spPr bwMode="auto">
-          <a:xfrm>
-            <a:off x="7670572" y="2405659"/>
-            <a:ext cx="1107974" cy="2478362"/>
-          </a:xfrm>
-          <a:prstGeom prst="rect">
-            <a:avLst/>
-          </a:prstGeom>
-          <a:noFill/>
-          <a:extLst>
-            <a:ext uri="{909E8E84-426E-40DD-AFC4-6F175D3DCCD1}">
-              <a14:hiddenFill xmlns:a14="http://schemas.microsoft.com/office/drawing/2010/main">
-                <a:solidFill>
-                  <a:srgbClr val="FFFFFF"/>
-                </a:solidFill>
-              </a14:hiddenFill>
-            </a:ext>
-          </a:extLst>
-        </p:spPr>
-      </p:pic>
-      <p:pic>
-        <p:nvPicPr>
-          <p:cNvPr id="7182" name="Picture 14" descr="Image result for webpack"/>
-          <p:cNvPicPr>
-            <a:picLocks noChangeAspect="1" noChangeArrowheads="1"/>
-          </p:cNvPicPr>
-          <p:nvPr/>
-        </p:nvPicPr>
-        <p:blipFill>
-          <a:blip r:embed="rId8" cstate="print">
-            <a:extLst>
-              <a:ext uri="{28A0092B-C50C-407E-A947-70E740481C1C}">
-                <a14:useLocalDpi xmlns:a14="http://schemas.microsoft.com/office/drawing/2010/main" val="0"/>
-              </a:ext>
-            </a:extLst>
-          </a:blip>
-          <a:srcRect/>
-          <a:stretch>
-            <a:fillRect/>
-          </a:stretch>
-        </p:blipFill>
-        <p:spPr bwMode="auto">
-          <a:xfrm>
-            <a:off x="5200536" y="4478529"/>
-            <a:ext cx="1357789" cy="737632"/>
-          </a:xfrm>
-          <a:prstGeom prst="rect">
-            <a:avLst/>
-          </a:prstGeom>
-          <a:noFill/>
-          <a:extLst>
-            <a:ext uri="{909E8E84-426E-40DD-AFC4-6F175D3DCCD1}">
-              <a14:hiddenFill xmlns:a14="http://schemas.microsoft.com/office/drawing/2010/main">
-                <a:solidFill>
-                  <a:srgbClr val="FFFFFF"/>
-                </a:solidFill>
-              </a14:hiddenFill>
-            </a:ext>
-          </a:extLst>
-        </p:spPr>
-      </p:pic>
-    </p:spTree>
-    <p:extLst>
-      <p:ext uri="{BB962C8B-B14F-4D97-AF65-F5344CB8AC3E}">
-        <p14:creationId xmlns:p14="http://schemas.microsoft.com/office/powerpoint/2010/main" val="511918391"/>
-      </p:ext>
-    </p:extLst>
-  </p:cSld>
-  <p:clrMapOvr>
-    <a:masterClrMapping/>
-  </p:clrMapOvr>
-  <mc:AlternateContent xmlns:mc="http://schemas.openxmlformats.org/markup-compatibility/2006" xmlns:p14="http://schemas.microsoft.com/office/powerpoint/2010/main">
-    <mc:Choice Requires="p14">
-      <p:transition spd="slow" p14:dur="2000"/>
-    </mc:Choice>
-    <mc:Fallback xmlns="">
-      <p:transition spd="slow"/>
-    </mc:Fallback>
-  </mc:AlternateContent>
-  <p:timing>
-    <p:tnLst>
-      <p:par>
-        <p:cTn id="1" dur="indefinite" restart="never" nodeType="tmRoot"/>
-      </p:par>
-    </p:tnLst>
-  </p:timing>
-</p:sld>
-</file>
-
-<file path=ppt/slides/slide21.xml><?xml version="1.0" encoding="utf-8"?>
-<p:sld xmlns:a="http://schemas.openxmlformats.org/drawingml/2006/main" xmlns:r="http://schemas.openxmlformats.org/officeDocument/2006/relationships" xmlns:p="http://schemas.openxmlformats.org/presentationml/2006/main">
-  <p:cSld>
-    <p:spTree>
-      <p:nvGrpSpPr>
-        <p:cNvPr id="1" name=""/>
-        <p:cNvGrpSpPr/>
-        <p:nvPr/>
-      </p:nvGrpSpPr>
-      <p:grpSpPr>
-        <a:xfrm>
-          <a:off x="0" y="0"/>
-          <a:ext cx="0" cy="0"/>
-          <a:chOff x="0" y="0"/>
-          <a:chExt cx="0" cy="0"/>
-        </a:xfrm>
-      </p:grpSpPr>
-      <p:sp>
-        <p:nvSpPr>
-          <p:cNvPr id="4" name="Text Placeholder 3"/>
-          <p:cNvSpPr>
-            <a:spLocks noGrp="1"/>
-          </p:cNvSpPr>
-          <p:nvPr>
-            <p:ph type="body" sz="quarter" idx="11"/>
-          </p:nvPr>
-        </p:nvSpPr>
-        <p:spPr/>
-        <p:txBody>
-          <a:bodyPr/>
-          <a:lstStyle/>
-          <a:p>
-            <a:r>
-              <a:rPr lang="en-US" sz="4050" dirty="0"/>
-              <a:t>Demo – Hello World </a:t>
-            </a:r>
-          </a:p>
-          <a:p>
-            <a:pPr marL="514350" indent="-514350">
-              <a:buFont typeface="Arial" panose="020B0604020202020204" pitchFamily="34" charset="0"/>
-              <a:buChar char="•"/>
-            </a:pPr>
-            <a:r>
-              <a:rPr lang="en-US" sz="4050" dirty="0"/>
-              <a:t>from the local </a:t>
-            </a:r>
-            <a:r>
-              <a:rPr lang="sr-Latn-RS" sz="4050" dirty="0"/>
-              <a:t>W</a:t>
-            </a:r>
-            <a:r>
-              <a:rPr lang="en-US" sz="4050" dirty="0" err="1"/>
-              <a:t>orkbench</a:t>
-            </a:r>
-            <a:endParaRPr lang="en-US" sz="4050" dirty="0"/>
-          </a:p>
-          <a:p>
-            <a:pPr marL="514350" indent="-514350">
-              <a:buFont typeface="Arial" panose="020B0604020202020204" pitchFamily="34" charset="0"/>
-              <a:buChar char="•"/>
-            </a:pPr>
-            <a:r>
-              <a:rPr lang="en-US" sz="4050" dirty="0"/>
-              <a:t>from the Cloud</a:t>
-            </a:r>
-            <a:endParaRPr lang="en-CA" sz="4050" dirty="0"/>
-          </a:p>
-        </p:txBody>
-      </p:sp>
-    </p:spTree>
-    <p:extLst>
-      <p:ext uri="{BB962C8B-B14F-4D97-AF65-F5344CB8AC3E}">
-        <p14:creationId xmlns:p14="http://schemas.microsoft.com/office/powerpoint/2010/main" val="3920052671"/>
-      </p:ext>
-    </p:extLst>
-  </p:cSld>
-  <p:clrMapOvr>
-    <a:masterClrMapping/>
-  </p:clrMapOvr>
-  <mc:AlternateContent xmlns:mc="http://schemas.openxmlformats.org/markup-compatibility/2006" xmlns:p14="http://schemas.microsoft.com/office/powerpoint/2010/main">
-    <mc:Choice Requires="p14">
-      <p:transition spd="slow" p14:dur="1600">
-        <p14:gallery dir="l"/>
-      </p:transition>
-    </mc:Choice>
-    <mc:Fallback xmlns="">
-      <p:transition spd="slow">
-        <p:fade/>
-      </p:transition>
-    </mc:Fallback>
-  </mc:AlternateContent>
-  <p:timing>
-    <p:tnLst>
-      <p:par>
-        <p:cTn id="1" dur="indefinite" restart="never" nodeType="tmRoot"/>
-      </p:par>
-    </p:tnLst>
-  </p:timing>
-</p:sld>
-</file>
-
-<file path=ppt/slides/slide22.xml><?xml version="1.0" encoding="utf-8"?>
-<p:sld xmlns:a="http://schemas.openxmlformats.org/drawingml/2006/main" xmlns:r="http://schemas.openxmlformats.org/officeDocument/2006/relationships" xmlns:p="http://schemas.openxmlformats.org/presentationml/2006/main">
-  <p:cSld>
-    <p:spTree>
-      <p:nvGrpSpPr>
-        <p:cNvPr id="1" name=""/>
-        <p:cNvGrpSpPr/>
-        <p:nvPr/>
-      </p:nvGrpSpPr>
-      <p:grpSpPr>
-        <a:xfrm>
-          <a:off x="0" y="0"/>
-          <a:ext cx="0" cy="0"/>
-          <a:chOff x="0" y="0"/>
-          <a:chExt cx="0" cy="0"/>
-        </a:xfrm>
-      </p:grpSpPr>
-      <p:sp>
-        <p:nvSpPr>
           <p:cNvPr id="2" name="Title 1"/>
           <p:cNvSpPr>
             <a:spLocks noGrp="1"/>
@@ -7568,7 +6704,7 @@
 </p:sld>
 </file>
 
-<file path=ppt/slides/slide23.xml><?xml version="1.0" encoding="utf-8"?>
+<file path=ppt/slides/slide21.xml><?xml version="1.0" encoding="utf-8"?>
 <p:sld xmlns:a="http://schemas.openxmlformats.org/drawingml/2006/main" xmlns:r="http://schemas.openxmlformats.org/officeDocument/2006/relationships" xmlns:p="http://schemas.openxmlformats.org/presentationml/2006/main">
   <p:cSld>
     <p:spTree>
@@ -7601,7 +6737,7 @@
         </p:blipFill>
         <p:spPr>
           <a:xfrm>
-            <a:off x="296333" y="1920479"/>
+            <a:off x="297180" y="1628800"/>
             <a:ext cx="8389620" cy="3704593"/>
           </a:xfrm>
           <a:prstGeom prst="rect">
@@ -7652,7 +6788,7 @@
 </p:sld>
 </file>
 
-<file path=ppt/slides/slide24.xml><?xml version="1.0" encoding="utf-8"?>
+<file path=ppt/slides/slide22.xml><?xml version="1.0" encoding="utf-8"?>
 <p:sld xmlns:a="http://schemas.openxmlformats.org/drawingml/2006/main" xmlns:r="http://schemas.openxmlformats.org/officeDocument/2006/relationships" xmlns:p="http://schemas.openxmlformats.org/presentationml/2006/main">
   <p:cSld>
     <p:spTree>
@@ -7685,26 +6821,34 @@
           <a:lstStyle/>
           <a:p>
             <a:r>
-              <a:rPr lang="en-US" dirty="0" err="1" smtClean="0"/>
-              <a:t>Preporuke</a:t>
-            </a:r>
-            <a:r>
-              <a:rPr lang="en-US" dirty="0" smtClean="0"/>
+              <a:rPr lang="en-GB" dirty="0" err="1" smtClean="0">
+                <a:solidFill>
+                  <a:srgbClr val="FF0000"/>
+                </a:solidFill>
+              </a:rPr>
+              <a:t>Korisni</a:t>
+            </a:r>
+            <a:r>
+              <a:rPr lang="en-GB" dirty="0" smtClean="0">
+                <a:solidFill>
+                  <a:srgbClr val="FF0000"/>
+                </a:solidFill>
+              </a:rPr>
               <a:t> </a:t>
             </a:r>
             <a:r>
-              <a:rPr lang="en-US" dirty="0" err="1" smtClean="0"/>
-              <a:t>za</a:t>
-            </a:r>
-            <a:r>
-              <a:rPr lang="en-US" dirty="0" smtClean="0"/>
-              <a:t> </a:t>
-            </a:r>
-            <a:r>
-              <a:rPr lang="sr-Latn-RS" dirty="0" smtClean="0"/>
-              <a:t>učenje</a:t>
-            </a:r>
-            <a:endParaRPr lang="en-GB" dirty="0"/>
+              <a:rPr lang="en-GB" dirty="0" err="1" smtClean="0">
+                <a:solidFill>
+                  <a:srgbClr val="FF0000"/>
+                </a:solidFill>
+              </a:rPr>
+              <a:t>linkovi</a:t>
+            </a:r>
+            <a:endParaRPr lang="en-GB" dirty="0">
+              <a:solidFill>
+                <a:srgbClr val="FF0000"/>
+              </a:solidFill>
+            </a:endParaRPr>
           </a:p>
         </p:txBody>
       </p:sp>
@@ -7916,7 +7060,7 @@
 </p:sld>
 </file>
 
-<file path=ppt/slides/slide25.xml><?xml version="1.0" encoding="utf-8"?>
+<file path=ppt/slides/slide23.xml><?xml version="1.0" encoding="utf-8"?>
 <p:sld xmlns:a="http://schemas.openxmlformats.org/drawingml/2006/main" xmlns:r="http://schemas.openxmlformats.org/officeDocument/2006/relationships" xmlns:p="http://schemas.openxmlformats.org/presentationml/2006/main">
   <p:cSld>
     <p:spTree>
@@ -8119,14 +7263,29 @@
           <a:p>
             <a:pPr algn="ctr"/>
             <a:r>
-              <a:rPr lang="en-US" sz="5400" dirty="0"/>
-              <a:t>Have a nice weekend</a:t>
-            </a:r>
-            <a:r>
-              <a:rPr lang="sr-Latn-RS" sz="5400" dirty="0"/>
-              <a:t>!</a:t>
-            </a:r>
-            <a:endParaRPr lang="en-US" sz="5400" dirty="0"/>
+              <a:rPr lang="sr-Latn-RS" sz="5400" dirty="0" smtClean="0"/>
+              <a:t>Materijal sa prezentacije:</a:t>
+            </a:r>
+          </a:p>
+          <a:p>
+            <a:pPr algn="ctr"/>
+            <a:r>
+              <a:rPr lang="en-US" sz="3000" dirty="0">
+                <a:hlinkClick r:id="rId3"/>
+              </a:rPr>
+              <a:t>https://</a:t>
+            </a:r>
+            <a:r>
+              <a:rPr lang="en-US" sz="3000" dirty="0" smtClean="0">
+                <a:hlinkClick r:id="rId3"/>
+              </a:rPr>
+              <a:t>github.com/rostojic/MeetUp-Kg-Sept2017</a:t>
+            </a:r>
+            <a:r>
+              <a:rPr lang="sr-Latn-RS" sz="3000" dirty="0" smtClean="0"/>
+              <a:t> </a:t>
+            </a:r>
+            <a:endParaRPr lang="en-US" sz="3000" dirty="0"/>
           </a:p>
         </p:txBody>
       </p:sp>
@@ -8222,8 +7381,17 @@
               <a:rPr lang="sr-Latn-RS" sz="4350" spc="-77" dirty="0">
                 <a:latin typeface="Segoe UI Light"/>
               </a:rPr>
-              <a:t>O predavaču</a:t>
-            </a:r>
+              <a:t>O </a:t>
+            </a:r>
+            <a:r>
+              <a:rPr lang="sr-Latn-RS" sz="4350" spc="-77" dirty="0" smtClean="0">
+                <a:latin typeface="Segoe UI Light"/>
+              </a:rPr>
+              <a:t>meni</a:t>
+            </a:r>
+            <a:endParaRPr lang="sr-Latn-RS" sz="4350" spc="-77" dirty="0">
+              <a:latin typeface="Segoe UI Light"/>
+            </a:endParaRPr>
           </a:p>
         </p:txBody>
       </p:sp>
@@ -8520,45 +7688,27 @@
             </a:r>
             <a:r>
               <a:rPr lang="en-GB" sz="2400" dirty="0" err="1"/>
-              <a:t>.Net</a:t>
-            </a:r>
-            <a:r>
-              <a:rPr lang="en-GB" sz="2400" dirty="0"/>
               <a:t>.</a:t>
             </a:r>
-          </a:p>
-          <a:p>
-            <a:endParaRPr lang="en-US" sz="2400" dirty="0"/>
-          </a:p>
-          <a:p>
-            <a:r>
-              <a:rPr lang="en-US" sz="2400" dirty="0" err="1"/>
-              <a:t>Zaposlen</a:t>
-            </a:r>
-            <a:r>
-              <a:rPr lang="en-US" sz="2400" dirty="0"/>
-              <a:t> u Comtrade SE </a:t>
-            </a:r>
-            <a:r>
-              <a:rPr lang="en-US" sz="2400" dirty="0" err="1"/>
-              <a:t>kao</a:t>
-            </a:r>
-            <a:r>
-              <a:rPr lang="en-US" sz="2400" dirty="0"/>
-              <a:t> Lead in</a:t>
-            </a:r>
-            <a:r>
-              <a:rPr lang="sr-Latn-RS" sz="2400" dirty="0"/>
-              <a:t>ženjer</a:t>
-            </a:r>
-            <a:endParaRPr lang="en-US" sz="2400" dirty="0"/>
-          </a:p>
-          <a:p>
-            <a:endParaRPr lang="en-GB" sz="2400" dirty="0"/>
-          </a:p>
-          <a:p>
-            <a:r>
-              <a:rPr lang="en-GB" sz="2400" dirty="0" err="1"/>
+            <a:r>
+              <a:rPr lang="en-GB" sz="2400" dirty="0" err="1" smtClean="0"/>
+              <a:t>Net</a:t>
+            </a:r>
+            <a:r>
+              <a:rPr lang="sr-Latn-RS" sz="2400" dirty="0" smtClean="0"/>
+              <a:t> WPF</a:t>
+            </a:r>
+            <a:r>
+              <a:rPr lang="en-GB" sz="2400" dirty="0" smtClean="0"/>
+              <a:t>.</a:t>
+            </a:r>
+          </a:p>
+          <a:p>
+            <a:endParaRPr lang="en-US" sz="2400" dirty="0" smtClean="0"/>
+          </a:p>
+          <a:p>
+            <a:r>
+              <a:rPr lang="en-GB" sz="2400" dirty="0" err="1" smtClean="0"/>
               <a:t>Trenutn</a:t>
             </a:r>
             <a:r>
@@ -8567,11 +7717,7 @@
             </a:r>
             <a:r>
               <a:rPr lang="en-GB" sz="2400" dirty="0"/>
-              <a:t> </a:t>
-            </a:r>
-            <a:r>
-              <a:rPr lang="en-GB" sz="2400" dirty="0"/>
-              <a:t>Vanderlande </a:t>
+              <a:t> Vanderlande </a:t>
             </a:r>
             <a:r>
               <a:rPr lang="en-GB" sz="2400" dirty="0" err="1"/>
@@ -8631,14 +7777,52 @@
             </a:r>
             <a:r>
               <a:rPr lang="en-GB" sz="2400" dirty="0"/>
-              <a:t> warehouse </a:t>
-            </a:r>
-            <a:r>
-              <a:rPr lang="en-GB" sz="2400" dirty="0"/>
-              <a:t>automation-a</a:t>
-            </a:r>
-            <a:r>
-              <a:rPr lang="sr-Latn-RS" sz="2400" dirty="0"/>
+              <a:t> warehouse automation-a</a:t>
+            </a:r>
+            <a:r>
+              <a:rPr lang="sr-Latn-RS" sz="2400" dirty="0" smtClean="0"/>
+              <a:t>.</a:t>
+            </a:r>
+            <a:endParaRPr lang="en-US" sz="2400" dirty="0" smtClean="0"/>
+          </a:p>
+          <a:p>
+            <a:endParaRPr lang="en-US" sz="2400" dirty="0"/>
+          </a:p>
+          <a:p>
+            <a:r>
+              <a:rPr lang="en-US" sz="2400" dirty="0" smtClean="0"/>
+              <a:t>QA </a:t>
+            </a:r>
+            <a:r>
+              <a:rPr lang="en-US" sz="2400" dirty="0" err="1" smtClean="0"/>
+              <a:t>na</a:t>
+            </a:r>
+            <a:r>
+              <a:rPr lang="en-US" sz="2400" dirty="0" smtClean="0"/>
+              <a:t> ACP </a:t>
+            </a:r>
+            <a:r>
+              <a:rPr lang="en-US" sz="2400" dirty="0" err="1" smtClean="0"/>
+              <a:t>projektu</a:t>
+            </a:r>
+            <a:r>
+              <a:rPr lang="en-US" sz="2400" dirty="0" smtClean="0"/>
+              <a:t> u E.1 </a:t>
+            </a:r>
+            <a:r>
+              <a:rPr lang="en-US" sz="2400" dirty="0" err="1" smtClean="0"/>
+              <a:t>timu</a:t>
+            </a:r>
+            <a:r>
+              <a:rPr lang="en-US" sz="2400" dirty="0" smtClean="0"/>
+              <a:t> – </a:t>
+            </a:r>
+            <a:r>
+              <a:rPr lang="en-US" sz="2400" dirty="0" err="1" smtClean="0"/>
+              <a:t>autopaletiser</a:t>
+            </a:r>
+            <a:r>
+              <a:rPr lang="en-US" sz="2400" dirty="0" smtClean="0"/>
               <a:t>.</a:t>
             </a:r>
             <a:endParaRPr lang="en-GB" sz="2400" dirty="0"/>
@@ -9028,12 +8212,6 @@
               </a:rPr>
               <a:t>Prethodnici: Farm Solution, App/Add in model</a:t>
             </a:r>
-            <a:endParaRPr lang="sr-Latn-RS" sz="1800" dirty="0">
-              <a:solidFill>
-                <a:srgbClr val="1F497D"/>
-              </a:solidFill>
-              <a:latin typeface="Segoe UI"/>
-            </a:endParaRPr>
           </a:p>
           <a:p>
             <a:pPr marL="257175" indent="-257175" defTabSz="699557">
@@ -9614,12 +8792,12 @@
           <a:lstStyle/>
           <a:p>
             <a:r>
-              <a:rPr lang="en-US" b="1" dirty="0"/>
-              <a:t>Customizations run in current </a:t>
-            </a:r>
-            <a:r>
-              <a:rPr lang="en-US" b="1" dirty="0" smtClean="0"/>
-              <a:t>context</a:t>
+              <a:rPr lang="en-GB" b="1" dirty="0"/>
+              <a:t>Customizations responsive &amp; </a:t>
+            </a:r>
+            <a:r>
+              <a:rPr lang="en-GB" b="1" dirty="0" smtClean="0"/>
+              <a:t>accessible</a:t>
             </a:r>
             <a:endParaRPr lang="en-GB" dirty="0"/>
           </a:p>
@@ -9635,33 +8813,80 @@
             <p:ph idx="1"/>
           </p:nvPr>
         </p:nvSpPr>
-        <p:spPr/>
-        <p:txBody>
-          <a:bodyPr>
-            <a:noAutofit/>
-          </a:bodyPr>
+        <p:spPr>
+          <a:xfrm>
+            <a:off x="35496" y="1628800"/>
+            <a:ext cx="8729134" cy="3894026"/>
+          </a:xfrm>
+        </p:spPr>
+        <p:txBody>
+          <a:bodyPr/>
           <a:lstStyle/>
           <a:p>
             <a:r>
-              <a:rPr lang="en-US" sz="2400" dirty="0"/>
-              <a:t>Components built using the SharePoint Framework will run in the current context, unlike their predecessor add-ins that ran within the context of an IFRAME. This means not only will they load faster, but they will run within the context of the current user and using the current connection in the browser.</a:t>
-            </a:r>
-          </a:p>
-          <a:p>
-            <a:r>
-              <a:rPr lang="en-US" sz="2400" dirty="0"/>
-              <a:t>SharePoint Framework customizations are also rendered in the current page DOM, again not in an IFRAME, which eliminates the requirement (but not the ability) to host more involved customizations in another website.</a:t>
-            </a:r>
-          </a:p>
-          <a:p>
-            <a:endParaRPr lang="en-GB" sz="2400" dirty="0"/>
-          </a:p>
-        </p:txBody>
-      </p:sp>
+              <a:rPr lang="en-US" dirty="0" smtClean="0"/>
+              <a:t>No IFRAME:</a:t>
+            </a:r>
+          </a:p>
+          <a:p>
+            <a:pPr lvl="1"/>
+            <a:r>
+              <a:rPr lang="en-US" dirty="0" smtClean="0"/>
+              <a:t>One </a:t>
+            </a:r>
+            <a:r>
+              <a:rPr lang="en-US" dirty="0"/>
+              <a:t>of the biggest benefits to this is that the customizations will be responsive and accessible by nature.</a:t>
+            </a:r>
+            <a:endParaRPr lang="en-GB" dirty="0"/>
+          </a:p>
+        </p:txBody>
+      </p:sp>
+      <p:pic>
+        <p:nvPicPr>
+          <p:cNvPr id="5122" name="Picture 2" descr="Image result for Customizations responsive &amp; accessible spfx"/>
+          <p:cNvPicPr>
+            <a:picLocks noChangeAspect="1" noChangeArrowheads="1"/>
+          </p:cNvPicPr>
+          <p:nvPr/>
+        </p:nvPicPr>
+        <p:blipFill>
+          <a:blip r:embed="rId2">
+            <a:extLst>
+              <a:ext uri="{28A0092B-C50C-407E-A947-70E740481C1C}">
+                <a14:useLocalDpi xmlns:a14="http://schemas.microsoft.com/office/drawing/2010/main" val="0"/>
+              </a:ext>
+            </a:extLst>
+          </a:blip>
+          <a:srcRect/>
+          <a:stretch>
+            <a:fillRect/>
+          </a:stretch>
+        </p:blipFill>
+        <p:spPr bwMode="auto">
+          <a:xfrm>
+            <a:off x="1835696" y="3429000"/>
+            <a:ext cx="4896544" cy="2754307"/>
+          </a:xfrm>
+          <a:prstGeom prst="rect">
+            <a:avLst/>
+          </a:prstGeom>
+          <a:noFill/>
+          <a:extLst>
+            <a:ext uri="{909E8E84-426E-40DD-AFC4-6F175D3DCCD1}">
+              <a14:hiddenFill xmlns:a14="http://schemas.microsoft.com/office/drawing/2010/main">
+                <a:solidFill>
+                  <a:srgbClr val="FFFFFF"/>
+                </a:solidFill>
+              </a14:hiddenFill>
+            </a:ext>
+          </a:extLst>
+        </p:spPr>
+      </p:pic>
     </p:spTree>
     <p:extLst>
       <p:ext uri="{BB962C8B-B14F-4D97-AF65-F5344CB8AC3E}">
-        <p14:creationId xmlns:p14="http://schemas.microsoft.com/office/powerpoint/2010/main" val="628618366"/>
+        <p14:creationId xmlns:p14="http://schemas.microsoft.com/office/powerpoint/2010/main" val="1780065308"/>
       </p:ext>
     </p:extLst>
   </p:cSld>

</xml_diff>